<commit_message>
revisi subfunction checkpoint 1
</commit_message>
<xml_diff>
--- a/Assignment/Checkpoint 1 Rasyid Fajar.pptx
+++ b/Assignment/Checkpoint 1 Rasyid Fajar.pptx
@@ -5,10 +5,10 @@
     <p:sldMasterId id="2147483660" r:id="rId1"/>
   </p:sldMasterIdLst>
   <p:notesMasterIdLst>
-    <p:notesMasterId r:id="rId13"/>
+    <p:notesMasterId r:id="rId14"/>
   </p:notesMasterIdLst>
   <p:handoutMasterIdLst>
-    <p:handoutMasterId r:id="rId14"/>
+    <p:handoutMasterId r:id="rId15"/>
   </p:handoutMasterIdLst>
   <p:sldIdLst>
     <p:sldId id="1984" r:id="rId2"/>
@@ -18,10 +18,11 @@
     <p:sldId id="2043" r:id="rId6"/>
     <p:sldId id="2042" r:id="rId7"/>
     <p:sldId id="2036" r:id="rId8"/>
-    <p:sldId id="2037" r:id="rId9"/>
-    <p:sldId id="2038" r:id="rId10"/>
-    <p:sldId id="2040" r:id="rId11"/>
-    <p:sldId id="2013" r:id="rId12"/>
+    <p:sldId id="2044" r:id="rId9"/>
+    <p:sldId id="2037" r:id="rId10"/>
+    <p:sldId id="2038" r:id="rId11"/>
+    <p:sldId id="2040" r:id="rId12"/>
+    <p:sldId id="2013" r:id="rId13"/>
   </p:sldIdLst>
   <p:sldSz cx="12192000" cy="6858000"/>
   <p:notesSz cx="6858000" cy="9144000"/>
@@ -225,7 +226,7 @@
           <a:p>
             <a:fld id="{A8EECF0F-CAC3-4ED7-9708-1365DD0C4F4D}" type="datetimeFigureOut">
               <a:rPr lang="en-US" smtClean="0"/>
-              <a:t>12/22/2020</a:t>
+              <a:t>12/24/2020</a:t>
             </a:fld>
             <a:endParaRPr lang="en-US"/>
           </a:p>
@@ -402,7 +403,7 @@
           <a:p>
             <a:fld id="{BD35594B-E29F-4FDC-91C0-134F9DE2B2B1}" type="datetimeFigureOut">
               <a:rPr lang="en-US" smtClean="0"/>
-              <a:t>12/22/2020</a:t>
+              <a:t>12/24/2020</a:t>
             </a:fld>
             <a:endParaRPr lang="en-US"/>
           </a:p>
@@ -753,6 +754,90 @@
 </p:notes>
 </file>
 
+<file path=ppt/notesSlides/notesSlide10.xml><?xml version="1.0" encoding="utf-8"?>
+<p:notes xmlns:a="http://schemas.openxmlformats.org/drawingml/2006/main" xmlns:r="http://schemas.openxmlformats.org/officeDocument/2006/relationships" xmlns:p="http://schemas.openxmlformats.org/presentationml/2006/main">
+  <p:cSld>
+    <p:spTree>
+      <p:nvGrpSpPr>
+        <p:cNvPr id="1" name=""/>
+        <p:cNvGrpSpPr/>
+        <p:nvPr/>
+      </p:nvGrpSpPr>
+      <p:grpSpPr>
+        <a:xfrm>
+          <a:off x="0" y="0"/>
+          <a:ext cx="0" cy="0"/>
+          <a:chOff x="0" y="0"/>
+          <a:chExt cx="0" cy="0"/>
+        </a:xfrm>
+      </p:grpSpPr>
+      <p:sp>
+        <p:nvSpPr>
+          <p:cNvPr id="2" name="Slide Image Placeholder 1"/>
+          <p:cNvSpPr>
+            <a:spLocks noGrp="1" noRot="1" noChangeAspect="1"/>
+          </p:cNvSpPr>
+          <p:nvPr>
+            <p:ph type="sldImg"/>
+          </p:nvPr>
+        </p:nvSpPr>
+        <p:spPr/>
+      </p:sp>
+      <p:sp>
+        <p:nvSpPr>
+          <p:cNvPr id="3" name="Notes Placeholder 2"/>
+          <p:cNvSpPr>
+            <a:spLocks noGrp="1"/>
+          </p:cNvSpPr>
+          <p:nvPr>
+            <p:ph type="body" idx="1"/>
+          </p:nvPr>
+        </p:nvSpPr>
+        <p:spPr/>
+        <p:txBody>
+          <a:bodyPr/>
+          <a:lstStyle/>
+          <a:p>
+            <a:endParaRPr lang="en-US" dirty="0"/>
+          </a:p>
+        </p:txBody>
+      </p:sp>
+      <p:sp>
+        <p:nvSpPr>
+          <p:cNvPr id="4" name="Slide Number Placeholder 3"/>
+          <p:cNvSpPr>
+            <a:spLocks noGrp="1"/>
+          </p:cNvSpPr>
+          <p:nvPr>
+            <p:ph type="sldNum" sz="quarter" idx="5"/>
+          </p:nvPr>
+        </p:nvSpPr>
+        <p:spPr/>
+        <p:txBody>
+          <a:bodyPr/>
+          <a:lstStyle/>
+          <a:p>
+            <a:fld id="{1D20C46C-817F-4F32-8EA1-CEBF08362F38}" type="slidenum">
+              <a:rPr lang="en-US" smtClean="0"/>
+              <a:t>11</a:t>
+            </a:fld>
+            <a:endParaRPr lang="en-US"/>
+          </a:p>
+        </p:txBody>
+      </p:sp>
+    </p:spTree>
+    <p:extLst>
+      <p:ext uri="{BB962C8B-B14F-4D97-AF65-F5344CB8AC3E}">
+        <p14:creationId xmlns:p14="http://schemas.microsoft.com/office/powerpoint/2010/main" val="709460198"/>
+      </p:ext>
+    </p:extLst>
+  </p:cSld>
+  <p:clrMapOvr>
+    <a:masterClrMapping/>
+  </p:clrMapOvr>
+</p:notes>
+</file>
+
 <file path=ppt/notesSlides/notesSlide2.xml><?xml version="1.0" encoding="utf-8"?>
 <p:notes xmlns:a="http://schemas.openxmlformats.org/drawingml/2006/main" xmlns:r="http://schemas.openxmlformats.org/officeDocument/2006/relationships" xmlns:p="http://schemas.openxmlformats.org/presentationml/2006/main">
   <p:cSld>
@@ -6175,7 +6260,7 @@
           <a:p>
             <a:fld id="{08F8B033-95FF-4545-9598-E27A92F5CFE2}" type="datetimeFigureOut">
               <a:rPr lang="en-US" smtClean="0"/>
-              <a:t>12/22/2020</a:t>
+              <a:t>12/24/2020</a:t>
             </a:fld>
             <a:endParaRPr lang="en-US"/>
           </a:p>
@@ -6865,10 +6950,10 @@
       </p:sp>
       <p:sp>
         <p:nvSpPr>
-          <p:cNvPr id="20" name="Rectangle: Rounded Corners 19">
+          <p:cNvPr id="9" name="Rectangle: Rounded Corners 8">
             <a:extLst>
               <a:ext uri="{FF2B5EF4-FFF2-40B4-BE49-F238E27FC236}">
-                <a16:creationId xmlns:a16="http://schemas.microsoft.com/office/drawing/2014/main" id="{68BB0343-4658-4AD7-BF6B-2E18EEF9FD17}"/>
+                <a16:creationId xmlns:a16="http://schemas.microsoft.com/office/drawing/2014/main" id="{E05724C9-81E0-4765-8D80-FE7CA3AED825}"/>
               </a:ext>
             </a:extLst>
           </p:cNvPr>
@@ -6877,8 +6962,8 @@
         </p:nvSpPr>
         <p:spPr>
           <a:xfrm>
-            <a:off x="365052" y="2252172"/>
-            <a:ext cx="2249001" cy="397949"/>
+            <a:off x="963012" y="1222021"/>
+            <a:ext cx="2120146" cy="397949"/>
           </a:xfrm>
           <a:prstGeom prst="roundRect">
             <a:avLst/>
@@ -6919,17 +7004,58 @@
                   <a:schemeClr val="tx1"/>
                 </a:solidFill>
               </a:rPr>
-              <a:t>CODE EXPLANATION</a:t>
+              <a:t>FUNCTION</a:t>
             </a:r>
           </a:p>
         </p:txBody>
       </p:sp>
       <p:sp>
         <p:nvSpPr>
-          <p:cNvPr id="41" name="Rectangle: Rounded Corners 40">
+          <p:cNvPr id="10" name="TextBox 9">
             <a:extLst>
               <a:ext uri="{FF2B5EF4-FFF2-40B4-BE49-F238E27FC236}">
-                <a16:creationId xmlns:a16="http://schemas.microsoft.com/office/drawing/2014/main" id="{04511FEB-7BD8-45EF-B5A1-EE8981B91C8F}"/>
+                <a16:creationId xmlns:a16="http://schemas.microsoft.com/office/drawing/2014/main" id="{ABEFD88C-0D9D-4444-85EC-0F8B03AD7839}"/>
+              </a:ext>
+            </a:extLst>
+          </p:cNvPr>
+          <p:cNvSpPr txBox="1"/>
+          <p:nvPr/>
+        </p:nvSpPr>
+        <p:spPr>
+          <a:xfrm>
+            <a:off x="1841875" y="1691747"/>
+            <a:ext cx="3589951" cy="461665"/>
+          </a:xfrm>
+          <a:prstGeom prst="rect">
+            <a:avLst/>
+          </a:prstGeom>
+          <a:noFill/>
+          <a:ln>
+            <a:solidFill>
+              <a:schemeClr val="tx1"/>
+            </a:solidFill>
+          </a:ln>
+        </p:spPr>
+        <p:txBody>
+          <a:bodyPr wrap="square" rtlCol="0">
+            <a:spAutoFit/>
+          </a:bodyPr>
+          <a:lstStyle/>
+          <a:p>
+            <a:pPr algn="just"/>
+            <a:r>
+              <a:rPr lang="en-US" sz="2400" dirty="0"/>
+              <a:t>Initialize patches</a:t>
+            </a:r>
+          </a:p>
+        </p:txBody>
+      </p:sp>
+      <p:sp>
+        <p:nvSpPr>
+          <p:cNvPr id="20" name="Rectangle: Rounded Corners 19">
+            <a:extLst>
+              <a:ext uri="{FF2B5EF4-FFF2-40B4-BE49-F238E27FC236}">
+                <a16:creationId xmlns:a16="http://schemas.microsoft.com/office/drawing/2014/main" id="{68BB0343-4658-4AD7-BF6B-2E18EEF9FD17}"/>
               </a:ext>
             </a:extLst>
           </p:cNvPr>
@@ -6938,8 +7064,8 @@
         </p:nvSpPr>
         <p:spPr>
           <a:xfrm>
-            <a:off x="6991567" y="881617"/>
-            <a:ext cx="2120146" cy="397949"/>
+            <a:off x="365052" y="2252172"/>
+            <a:ext cx="2249001" cy="397949"/>
           </a:xfrm>
           <a:prstGeom prst="roundRect">
             <a:avLst/>
@@ -6980,6 +7106,67 @@
                   <a:schemeClr val="tx1"/>
                 </a:solidFill>
               </a:rPr>
+              <a:t>CODE EXPLANATION</a:t>
+            </a:r>
+          </a:p>
+        </p:txBody>
+      </p:sp>
+      <p:sp>
+        <p:nvSpPr>
+          <p:cNvPr id="41" name="Rectangle: Rounded Corners 40">
+            <a:extLst>
+              <a:ext uri="{FF2B5EF4-FFF2-40B4-BE49-F238E27FC236}">
+                <a16:creationId xmlns:a16="http://schemas.microsoft.com/office/drawing/2014/main" id="{04511FEB-7BD8-45EF-B5A1-EE8981B91C8F}"/>
+              </a:ext>
+            </a:extLst>
+          </p:cNvPr>
+          <p:cNvSpPr/>
+          <p:nvPr/>
+        </p:nvSpPr>
+        <p:spPr>
+          <a:xfrm>
+            <a:off x="7713455" y="926333"/>
+            <a:ext cx="2120146" cy="397949"/>
+          </a:xfrm>
+          <a:prstGeom prst="roundRect">
+            <a:avLst/>
+          </a:prstGeom>
+          <a:solidFill>
+            <a:schemeClr val="bg1"/>
+          </a:solidFill>
+          <a:ln>
+            <a:solidFill>
+              <a:schemeClr val="tx1"/>
+            </a:solidFill>
+          </a:ln>
+        </p:spPr>
+        <p:style>
+          <a:lnRef idx="2">
+            <a:schemeClr val="accent1">
+              <a:shade val="50000"/>
+            </a:schemeClr>
+          </a:lnRef>
+          <a:fillRef idx="1">
+            <a:schemeClr val="accent1"/>
+          </a:fillRef>
+          <a:effectRef idx="0">
+            <a:schemeClr val="accent1"/>
+          </a:effectRef>
+          <a:fontRef idx="minor">
+            <a:schemeClr val="lt1"/>
+          </a:fontRef>
+        </p:style>
+        <p:txBody>
+          <a:bodyPr rtlCol="0" anchor="ctr"/>
+          <a:lstStyle/>
+          <a:p>
+            <a:pPr algn="ctr"/>
+            <a:r>
+              <a:rPr lang="en-US" b="1" dirty="0">
+                <a:solidFill>
+                  <a:schemeClr val="tx1"/>
+                </a:solidFill>
+              </a:rPr>
               <a:t>CODE</a:t>
             </a:r>
           </a:p>
@@ -7000,7 +7187,7 @@
         <p:spPr>
           <a:xfrm>
             <a:off x="601473" y="2641507"/>
-            <a:ext cx="4808111" cy="738664"/>
+            <a:ext cx="4650440" cy="738664"/>
           </a:xfrm>
           <a:prstGeom prst="rect">
             <a:avLst/>
@@ -7024,27 +7211,29 @@
             </a:pPr>
             <a:r>
               <a:rPr lang="en-US" sz="1400" dirty="0"/>
-              <a:t>Get the distance between picking station to entering queue</a:t>
-            </a:r>
-          </a:p>
-          <a:p>
-            <a:pPr marL="285750" indent="-285750">
-              <a:buFont typeface="Arial" panose="020B0604020202020204" pitchFamily="34" charset="0"/>
-              <a:buChar char="•"/>
-            </a:pPr>
+              <a:t>Still iterating over patches like previous slide</a:t>
+            </a:r>
+          </a:p>
+          <a:p>
+            <a:pPr lvl="1"/>
             <a:r>
               <a:rPr lang="en-US" sz="1400" dirty="0"/>
-              <a:t>Set entering-queue position  for all picking-station</a:t>
-            </a:r>
-          </a:p>
-          <a:p>
-            <a:pPr marL="285750" indent="-285750">
-              <a:buFont typeface="Arial" panose="020B0604020202020204" pitchFamily="34" charset="0"/>
-              <a:buChar char="•"/>
-            </a:pPr>
+              <a:t>Still </a:t>
+            </a:r>
+            <a:r>
+              <a:rPr lang="en-US" sz="1400" dirty="0" err="1"/>
+              <a:t>ifelse</a:t>
+            </a:r>
             <a:r>
               <a:rPr lang="en-US" sz="1400" dirty="0"/>
-              <a:t>Erase all turtles with shape equal to “int7” </a:t>
+              <a:t> from previous slide:</a:t>
+            </a:r>
+          </a:p>
+          <a:p>
+            <a:pPr lvl="1"/>
+            <a:r>
+              <a:rPr lang="en-US" sz="1400" dirty="0"/>
+              <a:t>	set current patch to corresponding desired value</a:t>
             </a:r>
           </a:p>
         </p:txBody>
@@ -7079,6 +7268,429 @@
           </a:prstGeom>
         </p:spPr>
       </p:pic>
+      <p:pic>
+        <p:nvPicPr>
+          <p:cNvPr id="5" name="Picture 4">
+            <a:extLst>
+              <a:ext uri="{FF2B5EF4-FFF2-40B4-BE49-F238E27FC236}">
+                <a16:creationId xmlns:a16="http://schemas.microsoft.com/office/drawing/2014/main" id="{D8FB1F64-E8D3-470C-BC73-F7BB208B1B44}"/>
+              </a:ext>
+            </a:extLst>
+          </p:cNvPr>
+          <p:cNvPicPr>
+            <a:picLocks noChangeAspect="1"/>
+          </p:cNvPicPr>
+          <p:nvPr/>
+        </p:nvPicPr>
+        <p:blipFill rotWithShape="1">
+          <a:blip r:embed="rId4"/>
+          <a:srcRect b="5066"/>
+          <a:stretch/>
+        </p:blipFill>
+        <p:spPr>
+          <a:xfrm>
+            <a:off x="6325567" y="1637608"/>
+            <a:ext cx="2904762" cy="3978169"/>
+          </a:xfrm>
+          <a:prstGeom prst="rect">
+            <a:avLst/>
+          </a:prstGeom>
+        </p:spPr>
+      </p:pic>
+      <p:pic>
+        <p:nvPicPr>
+          <p:cNvPr id="11" name="Picture 10">
+            <a:extLst>
+              <a:ext uri="{FF2B5EF4-FFF2-40B4-BE49-F238E27FC236}">
+                <a16:creationId xmlns:a16="http://schemas.microsoft.com/office/drawing/2014/main" id="{8E963827-2085-485C-88A2-7162C8A4AA5D}"/>
+              </a:ext>
+            </a:extLst>
+          </p:cNvPr>
+          <p:cNvPicPr>
+            <a:picLocks noChangeAspect="1"/>
+          </p:cNvPicPr>
+          <p:nvPr/>
+        </p:nvPicPr>
+        <p:blipFill>
+          <a:blip r:embed="rId5"/>
+          <a:stretch>
+            <a:fillRect/>
+          </a:stretch>
+        </p:blipFill>
+        <p:spPr>
+          <a:xfrm>
+            <a:off x="9243488" y="1637608"/>
+            <a:ext cx="2885714" cy="3466667"/>
+          </a:xfrm>
+          <a:prstGeom prst="rect">
+            <a:avLst/>
+          </a:prstGeom>
+        </p:spPr>
+      </p:pic>
+    </p:spTree>
+    <p:extLst>
+      <p:ext uri="{BB962C8B-B14F-4D97-AF65-F5344CB8AC3E}">
+        <p14:creationId xmlns:p14="http://schemas.microsoft.com/office/powerpoint/2010/main" val="3593010146"/>
+      </p:ext>
+    </p:extLst>
+  </p:cSld>
+  <p:clrMapOvr>
+    <a:masterClrMapping/>
+  </p:clrMapOvr>
+</p:sld>
+</file>
+
+<file path=ppt/slides/slide11.xml><?xml version="1.0" encoding="utf-8"?>
+<p:sld xmlns:a="http://schemas.openxmlformats.org/drawingml/2006/main" xmlns:r="http://schemas.openxmlformats.org/officeDocument/2006/relationships" xmlns:p="http://schemas.openxmlformats.org/presentationml/2006/main">
+  <p:cSld>
+    <p:spTree>
+      <p:nvGrpSpPr>
+        <p:cNvPr id="1" name=""/>
+        <p:cNvGrpSpPr/>
+        <p:nvPr/>
+      </p:nvGrpSpPr>
+      <p:grpSpPr>
+        <a:xfrm>
+          <a:off x="0" y="0"/>
+          <a:ext cx="0" cy="0"/>
+          <a:chOff x="0" y="0"/>
+          <a:chExt cx="0" cy="0"/>
+        </a:xfrm>
+      </p:grpSpPr>
+      <p:cxnSp>
+        <p:nvCxnSpPr>
+          <p:cNvPr id="7" name="Straight Connector 6">
+            <a:extLst>
+              <a:ext uri="{FF2B5EF4-FFF2-40B4-BE49-F238E27FC236}">
+                <a16:creationId xmlns:a16="http://schemas.microsoft.com/office/drawing/2014/main" id="{D70C1EBC-6FB7-4545-B20E-C31FCA9A0809}"/>
+              </a:ext>
+            </a:extLst>
+          </p:cNvPr>
+          <p:cNvCxnSpPr>
+            <a:cxnSpLocks/>
+          </p:cNvCxnSpPr>
+          <p:nvPr/>
+        </p:nvCxnSpPr>
+        <p:spPr>
+          <a:xfrm flipV="1">
+            <a:off x="0" y="837108"/>
+            <a:ext cx="12101517" cy="11097"/>
+          </a:xfrm>
+          <a:prstGeom prst="line">
+            <a:avLst/>
+          </a:prstGeom>
+          <a:ln>
+            <a:solidFill>
+              <a:schemeClr val="tx1"/>
+            </a:solidFill>
+          </a:ln>
+        </p:spPr>
+        <p:style>
+          <a:lnRef idx="1">
+            <a:schemeClr val="accent1"/>
+          </a:lnRef>
+          <a:fillRef idx="0">
+            <a:schemeClr val="accent1"/>
+          </a:fillRef>
+          <a:effectRef idx="0">
+            <a:schemeClr val="accent1"/>
+          </a:effectRef>
+          <a:fontRef idx="minor">
+            <a:schemeClr val="tx1"/>
+          </a:fontRef>
+        </p:style>
+      </p:cxnSp>
+      <p:sp>
+        <p:nvSpPr>
+          <p:cNvPr id="54" name="Title 3">
+            <a:extLst>
+              <a:ext uri="{FF2B5EF4-FFF2-40B4-BE49-F238E27FC236}">
+                <a16:creationId xmlns:a16="http://schemas.microsoft.com/office/drawing/2014/main" id="{EF72FD4F-BFAB-463B-9C4E-5234130038FD}"/>
+              </a:ext>
+            </a:extLst>
+          </p:cNvPr>
+          <p:cNvSpPr txBox="1">
+            <a:spLocks/>
+          </p:cNvSpPr>
+          <p:nvPr/>
+        </p:nvSpPr>
+        <p:spPr>
+          <a:xfrm>
+            <a:off x="838200" y="560005"/>
+            <a:ext cx="2242089" cy="535531"/>
+          </a:xfrm>
+          <a:prstGeom prst="rect">
+            <a:avLst/>
+          </a:prstGeom>
+          <a:solidFill>
+            <a:schemeClr val="bg1"/>
+          </a:solidFill>
+          <a:ln>
+            <a:solidFill>
+              <a:schemeClr val="tx1"/>
+            </a:solidFill>
+          </a:ln>
+        </p:spPr>
+        <p:txBody>
+          <a:bodyPr vert="horz" wrap="none" lIns="91440" tIns="45720" rIns="91440" bIns="45720" rtlCol="0" anchor="ctr">
+            <a:spAutoFit/>
+          </a:bodyPr>
+          <a:lstStyle>
+            <a:lvl1pPr algn="l" defTabSz="914400" rtl="0" eaLnBrk="1" latinLnBrk="0" hangingPunct="1">
+              <a:lnSpc>
+                <a:spcPct val="90000"/>
+              </a:lnSpc>
+              <a:spcBef>
+                <a:spcPct val="0"/>
+              </a:spcBef>
+              <a:buNone/>
+              <a:defRPr kumimoji="0" lang="en-US" sz="3200" b="1" i="0" u="none" strike="noStrike" kern="1200" cap="all" spc="0" normalizeH="0" baseline="0" dirty="0">
+                <a:ln>
+                  <a:noFill/>
+                </a:ln>
+                <a:solidFill>
+                  <a:schemeClr val="tx1">
+                    <a:lumMod val="75000"/>
+                    <a:lumOff val="25000"/>
+                  </a:schemeClr>
+                </a:solidFill>
+                <a:effectLst/>
+                <a:uLnTx/>
+                <a:uFillTx/>
+                <a:latin typeface="Calibri"/>
+                <a:ea typeface="Arial" charset="0"/>
+                <a:cs typeface="Arial" charset="0"/>
+              </a:defRPr>
+            </a:lvl1pPr>
+          </a:lstStyle>
+          <a:p>
+            <a:r>
+              <a:rPr lang="en-US" dirty="0">
+                <a:solidFill>
+                  <a:schemeClr val="tx1"/>
+                </a:solidFill>
+              </a:rPr>
+              <a:t>set-layout</a:t>
+            </a:r>
+          </a:p>
+        </p:txBody>
+      </p:sp>
+      <p:sp>
+        <p:nvSpPr>
+          <p:cNvPr id="20" name="Rectangle: Rounded Corners 19">
+            <a:extLst>
+              <a:ext uri="{FF2B5EF4-FFF2-40B4-BE49-F238E27FC236}">
+                <a16:creationId xmlns:a16="http://schemas.microsoft.com/office/drawing/2014/main" id="{68BB0343-4658-4AD7-BF6B-2E18EEF9FD17}"/>
+              </a:ext>
+            </a:extLst>
+          </p:cNvPr>
+          <p:cNvSpPr/>
+          <p:nvPr/>
+        </p:nvSpPr>
+        <p:spPr>
+          <a:xfrm>
+            <a:off x="365052" y="2252172"/>
+            <a:ext cx="2249001" cy="397949"/>
+          </a:xfrm>
+          <a:prstGeom prst="roundRect">
+            <a:avLst/>
+          </a:prstGeom>
+          <a:solidFill>
+            <a:schemeClr val="bg1"/>
+          </a:solidFill>
+          <a:ln>
+            <a:solidFill>
+              <a:schemeClr val="tx1"/>
+            </a:solidFill>
+          </a:ln>
+        </p:spPr>
+        <p:style>
+          <a:lnRef idx="2">
+            <a:schemeClr val="accent1">
+              <a:shade val="50000"/>
+            </a:schemeClr>
+          </a:lnRef>
+          <a:fillRef idx="1">
+            <a:schemeClr val="accent1"/>
+          </a:fillRef>
+          <a:effectRef idx="0">
+            <a:schemeClr val="accent1"/>
+          </a:effectRef>
+          <a:fontRef idx="minor">
+            <a:schemeClr val="lt1"/>
+          </a:fontRef>
+        </p:style>
+        <p:txBody>
+          <a:bodyPr rtlCol="0" anchor="ctr"/>
+          <a:lstStyle/>
+          <a:p>
+            <a:pPr algn="ctr"/>
+            <a:r>
+              <a:rPr lang="en-US" b="1" dirty="0">
+                <a:solidFill>
+                  <a:schemeClr val="tx1"/>
+                </a:solidFill>
+              </a:rPr>
+              <a:t>CODE EXPLANATION</a:t>
+            </a:r>
+          </a:p>
+        </p:txBody>
+      </p:sp>
+      <p:sp>
+        <p:nvSpPr>
+          <p:cNvPr id="41" name="Rectangle: Rounded Corners 40">
+            <a:extLst>
+              <a:ext uri="{FF2B5EF4-FFF2-40B4-BE49-F238E27FC236}">
+                <a16:creationId xmlns:a16="http://schemas.microsoft.com/office/drawing/2014/main" id="{04511FEB-7BD8-45EF-B5A1-EE8981B91C8F}"/>
+              </a:ext>
+            </a:extLst>
+          </p:cNvPr>
+          <p:cNvSpPr/>
+          <p:nvPr/>
+        </p:nvSpPr>
+        <p:spPr>
+          <a:xfrm>
+            <a:off x="6991567" y="881617"/>
+            <a:ext cx="2120146" cy="397949"/>
+          </a:xfrm>
+          <a:prstGeom prst="roundRect">
+            <a:avLst/>
+          </a:prstGeom>
+          <a:solidFill>
+            <a:schemeClr val="bg1"/>
+          </a:solidFill>
+          <a:ln>
+            <a:solidFill>
+              <a:schemeClr val="tx1"/>
+            </a:solidFill>
+          </a:ln>
+        </p:spPr>
+        <p:style>
+          <a:lnRef idx="2">
+            <a:schemeClr val="accent1">
+              <a:shade val="50000"/>
+            </a:schemeClr>
+          </a:lnRef>
+          <a:fillRef idx="1">
+            <a:schemeClr val="accent1"/>
+          </a:fillRef>
+          <a:effectRef idx="0">
+            <a:schemeClr val="accent1"/>
+          </a:effectRef>
+          <a:fontRef idx="minor">
+            <a:schemeClr val="lt1"/>
+          </a:fontRef>
+        </p:style>
+        <p:txBody>
+          <a:bodyPr rtlCol="0" anchor="ctr"/>
+          <a:lstStyle/>
+          <a:p>
+            <a:pPr algn="ctr"/>
+            <a:r>
+              <a:rPr lang="en-US" b="1" dirty="0">
+                <a:solidFill>
+                  <a:schemeClr val="tx1"/>
+                </a:solidFill>
+              </a:rPr>
+              <a:t>CODE</a:t>
+            </a:r>
+          </a:p>
+        </p:txBody>
+      </p:sp>
+      <p:sp>
+        <p:nvSpPr>
+          <p:cNvPr id="36" name="TextBox 35">
+            <a:extLst>
+              <a:ext uri="{FF2B5EF4-FFF2-40B4-BE49-F238E27FC236}">
+                <a16:creationId xmlns:a16="http://schemas.microsoft.com/office/drawing/2014/main" id="{E04E68AB-442E-4461-8C90-D21A636233C3}"/>
+              </a:ext>
+            </a:extLst>
+          </p:cNvPr>
+          <p:cNvSpPr txBox="1"/>
+          <p:nvPr/>
+        </p:nvSpPr>
+        <p:spPr>
+          <a:xfrm>
+            <a:off x="601473" y="2641507"/>
+            <a:ext cx="4808111" cy="738664"/>
+          </a:xfrm>
+          <a:prstGeom prst="rect">
+            <a:avLst/>
+          </a:prstGeom>
+          <a:noFill/>
+          <a:ln>
+            <a:solidFill>
+              <a:schemeClr val="tx1"/>
+            </a:solidFill>
+          </a:ln>
+        </p:spPr>
+        <p:txBody>
+          <a:bodyPr wrap="none" rtlCol="0">
+            <a:spAutoFit/>
+          </a:bodyPr>
+          <a:lstStyle/>
+          <a:p>
+            <a:pPr marL="285750" indent="-285750">
+              <a:buFont typeface="Arial" panose="020B0604020202020204" pitchFamily="34" charset="0"/>
+              <a:buChar char="•"/>
+            </a:pPr>
+            <a:r>
+              <a:rPr lang="en-US" sz="1400" dirty="0"/>
+              <a:t>Get the distance between picking station to entering queue</a:t>
+            </a:r>
+          </a:p>
+          <a:p>
+            <a:pPr marL="285750" indent="-285750">
+              <a:buFont typeface="Arial" panose="020B0604020202020204" pitchFamily="34" charset="0"/>
+              <a:buChar char="•"/>
+            </a:pPr>
+            <a:r>
+              <a:rPr lang="en-US" sz="1400" dirty="0"/>
+              <a:t>Set entering-queue position  for all picking-station</a:t>
+            </a:r>
+          </a:p>
+          <a:p>
+            <a:pPr marL="285750" indent="-285750">
+              <a:buFont typeface="Arial" panose="020B0604020202020204" pitchFamily="34" charset="0"/>
+              <a:buChar char="•"/>
+            </a:pPr>
+            <a:r>
+              <a:rPr lang="en-US" sz="1400" dirty="0"/>
+              <a:t>Erase all turtles with shape equal to “int7” </a:t>
+            </a:r>
+          </a:p>
+        </p:txBody>
+      </p:sp>
+      <p:pic>
+        <p:nvPicPr>
+          <p:cNvPr id="35" name="Picture 34">
+            <a:extLst>
+              <a:ext uri="{FF2B5EF4-FFF2-40B4-BE49-F238E27FC236}">
+                <a16:creationId xmlns:a16="http://schemas.microsoft.com/office/drawing/2014/main" id="{DC08E121-3A82-4F7A-ABB9-62FC472F7B94}"/>
+              </a:ext>
+            </a:extLst>
+          </p:cNvPr>
+          <p:cNvPicPr>
+            <a:picLocks noChangeAspect="1"/>
+          </p:cNvPicPr>
+          <p:nvPr/>
+        </p:nvPicPr>
+        <p:blipFill>
+          <a:blip r:embed="rId3"/>
+          <a:stretch>
+            <a:fillRect/>
+          </a:stretch>
+        </p:blipFill>
+        <p:spPr>
+          <a:xfrm>
+            <a:off x="-942944" y="2721122"/>
+            <a:ext cx="58782" cy="45719"/>
+          </a:xfrm>
+          <a:prstGeom prst="rect">
+            <a:avLst/>
+          </a:prstGeom>
+        </p:spPr>
+      </p:pic>
       <p:sp>
         <p:nvSpPr>
           <p:cNvPr id="47" name="Rectangle: Rounded Corners 46">
@@ -7350,7 +7962,7 @@
 </p:sld>
 </file>
 
-<file path=ppt/slides/slide11.xml><?xml version="1.0" encoding="utf-8"?>
+<file path=ppt/slides/slide12.xml><?xml version="1.0" encoding="utf-8"?>
 <p:sld xmlns:a="http://schemas.openxmlformats.org/drawingml/2006/main" xmlns:r="http://schemas.openxmlformats.org/officeDocument/2006/relationships" xmlns:p="http://schemas.openxmlformats.org/presentationml/2006/main">
   <p:cSld>
     <p:spTree>
@@ -12793,7 +13405,7 @@
         <p:spPr>
           <a:xfrm>
             <a:off x="6470113" y="4636841"/>
-            <a:ext cx="4456698" cy="1754326"/>
+            <a:ext cx="4456698" cy="2031325"/>
           </a:xfrm>
           <a:prstGeom prst="rect">
             <a:avLst/>
@@ -12860,6 +13472,20 @@
             <a:r>
               <a:rPr lang="en-GB" dirty="0"/>
               <a:t> ]</a:t>
+            </a:r>
+          </a:p>
+          <a:p>
+            <a:pPr marL="285750" indent="-285750">
+              <a:buFont typeface="Arial" panose="020B0604020202020204" pitchFamily="34" charset="0"/>
+              <a:buChar char="•"/>
+            </a:pPr>
+            <a:r>
+              <a:rPr lang="en-GB" dirty="0"/>
+              <a:t>file-open: file-open </a:t>
+            </a:r>
+            <a:r>
+              <a:rPr lang="en-GB" i="1" dirty="0"/>
+              <a:t>string</a:t>
             </a:r>
           </a:p>
           <a:p>
@@ -14966,7 +15592,7 @@
         <p:spPr>
           <a:xfrm>
             <a:off x="838200" y="560005"/>
-            <a:ext cx="2242089" cy="535531"/>
+            <a:ext cx="2234907" cy="535531"/>
           </a:xfrm>
           <a:prstGeom prst="rect">
             <a:avLst/>
@@ -15019,7 +15645,7 @@
                   <a:schemeClr val="tx1"/>
                 </a:solidFill>
               </a:rPr>
-              <a:t>set-layout</a:t>
+              <a:t>Place-item</a:t>
             </a:r>
           </a:p>
         </p:txBody>
@@ -15080,7 +15706,7 @@
                   <a:schemeClr val="tx1"/>
                 </a:solidFill>
               </a:rPr>
-              <a:t>FUNCTION</a:t>
+              <a:t>SUBFUNCTION</a:t>
             </a:r>
           </a:p>
         </p:txBody>
@@ -15121,7 +15747,7 @@
             <a:pPr algn="just"/>
             <a:r>
               <a:rPr lang="en-US" sz="2400" dirty="0"/>
-              <a:t>Initialize patches</a:t>
+              <a:t>Place items in a pod</a:t>
             </a:r>
           </a:p>
         </p:txBody>
@@ -15201,7 +15827,7 @@
         </p:nvSpPr>
         <p:spPr>
           <a:xfrm>
-            <a:off x="7713455" y="926333"/>
+            <a:off x="8661721" y="896561"/>
             <a:ext cx="2120146" cy="397949"/>
           </a:xfrm>
           <a:prstGeom prst="roundRect">
@@ -15262,8 +15888,8 @@
         </p:nvSpPr>
         <p:spPr>
           <a:xfrm>
-            <a:off x="601473" y="2641507"/>
-            <a:ext cx="5117491" cy="1815882"/>
+            <a:off x="353398" y="2641426"/>
+            <a:ext cx="7033336" cy="2677656"/>
           </a:xfrm>
           <a:prstGeom prst="rect">
             <a:avLst/>
@@ -15287,64 +15913,141 @@
             </a:pPr>
             <a:r>
               <a:rPr lang="en-US" sz="1400" dirty="0"/>
-              <a:t>Still iterating over patches like previous slide</a:t>
+              <a:t>Ask pod with specific id</a:t>
             </a:r>
           </a:p>
           <a:p>
             <a:pPr lvl="1"/>
             <a:r>
               <a:rPr lang="en-US" sz="1400" dirty="0"/>
-              <a:t>Still </a:t>
+              <a:t>Loop </a:t>
             </a:r>
             <a:r>
               <a:rPr lang="en-US" sz="1400" dirty="0" err="1"/>
-              <a:t>ifelse</a:t>
+              <a:t>sku</a:t>
             </a:r>
             <a:r>
               <a:rPr lang="en-US" sz="1400" dirty="0"/>
-              <a:t> from previous slide:</a:t>
+              <a:t>-per-pod times</a:t>
             </a:r>
           </a:p>
           <a:p>
             <a:pPr lvl="1"/>
             <a:r>
               <a:rPr lang="en-US" sz="1400" dirty="0"/>
-              <a:t>	Current item is pic:</a:t>
-            </a:r>
-          </a:p>
-          <a:p>
-            <a:pPr lvl="2"/>
+              <a:t>	get item-now </a:t>
+            </a:r>
+            <a:r>
+              <a:rPr lang="en-US" sz="1400" dirty="0" err="1"/>
+              <a:t>th</a:t>
+            </a:r>
             <a:r>
               <a:rPr lang="en-US" sz="1400" dirty="0"/>
-              <a:t>	set current patch to picking station</a:t>
-            </a:r>
-          </a:p>
-          <a:p>
-            <a:pPr lvl="2"/>
+              <a:t> index of </a:t>
+            </a:r>
+            <a:r>
+              <a:rPr lang="en-US" sz="1400" dirty="0" err="1"/>
+              <a:t>sku</a:t>
+            </a:r>
             <a:r>
               <a:rPr lang="en-US" sz="1400" dirty="0"/>
-              <a:t>Current item is rep:</a:t>
-            </a:r>
-          </a:p>
-          <a:p>
-            <a:pPr lvl="2"/>
+              <a:t>-shuffle</a:t>
+            </a:r>
+          </a:p>
+          <a:p>
+            <a:pPr lvl="1"/>
             <a:r>
               <a:rPr lang="en-US" sz="1400" dirty="0"/>
-              <a:t>	set current patch to replenishment station</a:t>
-            </a:r>
-          </a:p>
-          <a:p>
-            <a:pPr lvl="2"/>
-            <a:r>
-              <a:rPr lang="en-US" sz="1400" dirty="0"/>
-              <a:t>	stamp to draw the shape in the drawing</a:t>
-            </a:r>
-          </a:p>
-          <a:p>
-            <a:pPr lvl="2"/>
-            <a:r>
-              <a:rPr lang="en-US" sz="1400" dirty="0"/>
-              <a:t>	die to erase the turtle</a:t>
+              <a:t>	</a:t>
+            </a:r>
+            <a:r>
+              <a:rPr lang="en-GB" sz="1400" dirty="0"/>
+              <a:t>generate random number 5~15 with Poisson distribution for item qty in pod</a:t>
+            </a:r>
+          </a:p>
+          <a:p>
+            <a:pPr lvl="1"/>
+            <a:r>
+              <a:rPr lang="en-GB" sz="1400" dirty="0"/>
+              <a:t>	insert item-type, qty, due, and qty into </a:t>
+            </a:r>
+            <a:r>
+              <a:rPr lang="en-GB" sz="1400" dirty="0" err="1"/>
+              <a:t>sku</a:t>
+            </a:r>
+            <a:endParaRPr lang="en-GB" sz="1400" dirty="0"/>
+          </a:p>
+          <a:p>
+            <a:pPr lvl="1"/>
+            <a:r>
+              <a:rPr lang="en-GB" sz="1400" dirty="0"/>
+              <a:t>	insert </a:t>
+            </a:r>
+            <a:r>
+              <a:rPr lang="en-GB" sz="1400" dirty="0" err="1"/>
+              <a:t>sku</a:t>
+            </a:r>
+            <a:r>
+              <a:rPr lang="en-GB" sz="1400" dirty="0"/>
+              <a:t> into items</a:t>
+            </a:r>
+          </a:p>
+          <a:p>
+            <a:pPr lvl="1"/>
+            <a:r>
+              <a:rPr lang="en-GB" sz="1400" dirty="0"/>
+              <a:t>	</a:t>
+            </a:r>
+          </a:p>
+          <a:p>
+            <a:pPr lvl="1"/>
+            <a:r>
+              <a:rPr lang="en-GB" sz="1400" dirty="0"/>
+              <a:t>	open file “</a:t>
+            </a:r>
+            <a:r>
+              <a:rPr lang="en-GB" sz="1400" dirty="0" err="1"/>
+              <a:t>itemin</a:t>
+            </a:r>
+            <a:r>
+              <a:rPr lang="en-GB" sz="1400" dirty="0"/>
+              <a:t> pod.csv”</a:t>
+            </a:r>
+          </a:p>
+          <a:p>
+            <a:pPr lvl="1"/>
+            <a:r>
+              <a:rPr lang="en-GB" sz="1400" dirty="0"/>
+              <a:t>	write pod-id, item-type, qty, due, and qty into the file</a:t>
+            </a:r>
+          </a:p>
+          <a:p>
+            <a:pPr lvl="1"/>
+            <a:r>
+              <a:rPr lang="en-GB" sz="1400" dirty="0"/>
+              <a:t>	close file</a:t>
+            </a:r>
+          </a:p>
+          <a:p>
+            <a:pPr lvl="1"/>
+            <a:r>
+              <a:rPr lang="en-GB" sz="1400" dirty="0"/>
+              <a:t>	iterate loop</a:t>
+            </a:r>
+          </a:p>
+          <a:p>
+            <a:pPr lvl="1"/>
+            <a:r>
+              <a:rPr lang="en-GB" sz="1400" dirty="0"/>
+              <a:t>	iterate item-now and set item-now to 0 if item-now equal to length of </a:t>
+            </a:r>
+            <a:r>
+              <a:rPr lang="en-GB" sz="1400" dirty="0" err="1"/>
+              <a:t>sku</a:t>
+            </a:r>
+            <a:r>
+              <a:rPr lang="en-GB" sz="1400" dirty="0"/>
+              <a:t>-shuffle</a:t>
             </a:r>
           </a:p>
         </p:txBody>
@@ -15379,78 +16082,12 @@
           </a:prstGeom>
         </p:spPr>
       </p:pic>
-      <p:sp>
-        <p:nvSpPr>
-          <p:cNvPr id="48" name="Rectangle 47">
-            <a:extLst>
-              <a:ext uri="{FF2B5EF4-FFF2-40B4-BE49-F238E27FC236}">
-                <a16:creationId xmlns:a16="http://schemas.microsoft.com/office/drawing/2014/main" id="{7F290408-9744-4DCB-898B-13B57A4F0D01}"/>
-              </a:ext>
-            </a:extLst>
-          </p:cNvPr>
-          <p:cNvSpPr/>
-          <p:nvPr/>
-        </p:nvSpPr>
-        <p:spPr>
-          <a:xfrm>
-            <a:off x="5838038" y="5239965"/>
-            <a:ext cx="4914629" cy="923330"/>
-          </a:xfrm>
-          <a:prstGeom prst="rect">
-            <a:avLst/>
-          </a:prstGeom>
-        </p:spPr>
-        <p:txBody>
-          <a:bodyPr wrap="square">
-            <a:spAutoFit/>
-          </a:bodyPr>
-          <a:lstStyle/>
-          <a:p>
-            <a:pPr marL="285750" indent="-285750">
-              <a:buFont typeface="Arial" panose="020B0604020202020204" pitchFamily="34" charset="0"/>
-              <a:buChar char="•"/>
-            </a:pPr>
-            <a:r>
-              <a:rPr lang="en-US" dirty="0">
-                <a:latin typeface="Calibri (Body)"/>
-              </a:rPr>
-              <a:t>stamp	: s</a:t>
-            </a:r>
-            <a:r>
-              <a:rPr lang="en-GB" dirty="0"/>
-              <a:t>tamp</a:t>
-            </a:r>
-          </a:p>
-          <a:p>
-            <a:pPr marL="285750" indent="-285750">
-              <a:buFont typeface="Arial" panose="020B0604020202020204" pitchFamily="34" charset="0"/>
-              <a:buChar char="•"/>
-            </a:pPr>
-            <a:r>
-              <a:rPr lang="en-US" dirty="0">
-                <a:latin typeface="Calibri (Body)"/>
-              </a:rPr>
-              <a:t>die	: </a:t>
-            </a:r>
-            <a:r>
-              <a:rPr lang="en-GB" dirty="0"/>
-              <a:t>die</a:t>
-            </a:r>
-          </a:p>
-          <a:p>
-            <a:pPr lvl="1"/>
-            <a:endParaRPr lang="en-US" dirty="0">
-              <a:latin typeface="Calibri (Body)"/>
-            </a:endParaRPr>
-          </a:p>
-        </p:txBody>
-      </p:sp>
       <p:pic>
         <p:nvPicPr>
           <p:cNvPr id="6" name="Picture 5">
             <a:extLst>
               <a:ext uri="{FF2B5EF4-FFF2-40B4-BE49-F238E27FC236}">
-                <a16:creationId xmlns:a16="http://schemas.microsoft.com/office/drawing/2014/main" id="{DE2388C2-AD1F-44F1-A0D2-A0EA4264BFB1}"/>
+                <a16:creationId xmlns:a16="http://schemas.microsoft.com/office/drawing/2014/main" id="{67AC5E3B-2F36-4A4A-BAFD-A5280675243B}"/>
               </a:ext>
             </a:extLst>
           </p:cNvPr>
@@ -15467,79 +16104,18 @@
         </p:blipFill>
         <p:spPr>
           <a:xfrm>
-            <a:off x="6300420" y="1415551"/>
-            <a:ext cx="5290107" cy="3357688"/>
+            <a:off x="7263839" y="1342866"/>
+            <a:ext cx="4363335" cy="3511075"/>
           </a:xfrm>
           <a:prstGeom prst="rect">
             <a:avLst/>
           </a:prstGeom>
         </p:spPr>
       </p:pic>
-      <p:sp>
-        <p:nvSpPr>
-          <p:cNvPr id="21" name="Rectangle: Rounded Corners 20">
-            <a:extLst>
-              <a:ext uri="{FF2B5EF4-FFF2-40B4-BE49-F238E27FC236}">
-                <a16:creationId xmlns:a16="http://schemas.microsoft.com/office/drawing/2014/main" id="{9802B92E-0BBF-4D57-9A3D-FE1837456407}"/>
-              </a:ext>
-            </a:extLst>
-          </p:cNvPr>
-          <p:cNvSpPr/>
-          <p:nvPr/>
-        </p:nvSpPr>
-        <p:spPr>
-          <a:xfrm>
-            <a:off x="5838038" y="4864509"/>
-            <a:ext cx="2249001" cy="397949"/>
-          </a:xfrm>
-          <a:prstGeom prst="roundRect">
-            <a:avLst/>
-          </a:prstGeom>
-          <a:solidFill>
-            <a:schemeClr val="bg1"/>
-          </a:solidFill>
-          <a:ln>
-            <a:solidFill>
-              <a:schemeClr val="tx1"/>
-            </a:solidFill>
-          </a:ln>
-        </p:spPr>
-        <p:style>
-          <a:lnRef idx="2">
-            <a:schemeClr val="accent1">
-              <a:shade val="50000"/>
-            </a:schemeClr>
-          </a:lnRef>
-          <a:fillRef idx="1">
-            <a:schemeClr val="accent1"/>
-          </a:fillRef>
-          <a:effectRef idx="0">
-            <a:schemeClr val="accent1"/>
-          </a:effectRef>
-          <a:fontRef idx="minor">
-            <a:schemeClr val="lt1"/>
-          </a:fontRef>
-        </p:style>
-        <p:txBody>
-          <a:bodyPr rtlCol="0" anchor="ctr"/>
-          <a:lstStyle/>
-          <a:p>
-            <a:pPr algn="ctr"/>
-            <a:r>
-              <a:rPr lang="en-US" b="1" dirty="0">
-                <a:solidFill>
-                  <a:schemeClr val="tx1"/>
-                </a:solidFill>
-              </a:rPr>
-              <a:t>DICTIONARY</a:t>
-            </a:r>
-          </a:p>
-        </p:txBody>
-      </p:sp>
     </p:spTree>
     <p:extLst>
       <p:ext uri="{BB962C8B-B14F-4D97-AF65-F5344CB8AC3E}">
-        <p14:creationId xmlns:p14="http://schemas.microsoft.com/office/powerpoint/2010/main" val="3382369956"/>
+        <p14:creationId xmlns:p14="http://schemas.microsoft.com/office/powerpoint/2010/main" val="3590311000"/>
       </p:ext>
     </p:extLst>
   </p:cSld>
@@ -15923,7 +16499,7 @@
         <p:spPr>
           <a:xfrm>
             <a:off x="601473" y="2641507"/>
-            <a:ext cx="4650440" cy="738664"/>
+            <a:ext cx="5117491" cy="1815882"/>
           </a:xfrm>
           <a:prstGeom prst="rect">
             <a:avLst/>
@@ -15969,7 +16545,42 @@
             <a:pPr lvl="1"/>
             <a:r>
               <a:rPr lang="en-US" sz="1400" dirty="0"/>
-              <a:t>	set current patch to corresponding desired value</a:t>
+              <a:t>	Current item is pic:</a:t>
+            </a:r>
+          </a:p>
+          <a:p>
+            <a:pPr lvl="2"/>
+            <a:r>
+              <a:rPr lang="en-US" sz="1400" dirty="0"/>
+              <a:t>	set current patch to picking station</a:t>
+            </a:r>
+          </a:p>
+          <a:p>
+            <a:pPr lvl="2"/>
+            <a:r>
+              <a:rPr lang="en-US" sz="1400" dirty="0"/>
+              <a:t>Current item is rep:</a:t>
+            </a:r>
+          </a:p>
+          <a:p>
+            <a:pPr lvl="2"/>
+            <a:r>
+              <a:rPr lang="en-US" sz="1400" dirty="0"/>
+              <a:t>	set current patch to replenishment station</a:t>
+            </a:r>
+          </a:p>
+          <a:p>
+            <a:pPr lvl="2"/>
+            <a:r>
+              <a:rPr lang="en-US" sz="1400" dirty="0"/>
+              <a:t>	stamp to draw the shape in the drawing</a:t>
+            </a:r>
+          </a:p>
+          <a:p>
+            <a:pPr lvl="2"/>
+            <a:r>
+              <a:rPr lang="en-US" sz="1400" dirty="0"/>
+              <a:t>	die to erase the turtle</a:t>
             </a:r>
           </a:p>
         </p:txBody>
@@ -16004,41 +16615,78 @@
           </a:prstGeom>
         </p:spPr>
       </p:pic>
-      <p:pic>
-        <p:nvPicPr>
-          <p:cNvPr id="5" name="Picture 4">
+      <p:sp>
+        <p:nvSpPr>
+          <p:cNvPr id="48" name="Rectangle 47">
             <a:extLst>
               <a:ext uri="{FF2B5EF4-FFF2-40B4-BE49-F238E27FC236}">
-                <a16:creationId xmlns:a16="http://schemas.microsoft.com/office/drawing/2014/main" id="{D8FB1F64-E8D3-470C-BC73-F7BB208B1B44}"/>
+                <a16:creationId xmlns:a16="http://schemas.microsoft.com/office/drawing/2014/main" id="{7F290408-9744-4DCB-898B-13B57A4F0D01}"/>
               </a:ext>
             </a:extLst>
           </p:cNvPr>
-          <p:cNvPicPr>
-            <a:picLocks noChangeAspect="1"/>
-          </p:cNvPicPr>
+          <p:cNvSpPr/>
           <p:nvPr/>
-        </p:nvPicPr>
-        <p:blipFill rotWithShape="1">
-          <a:blip r:embed="rId4"/>
-          <a:srcRect b="5066"/>
-          <a:stretch/>
-        </p:blipFill>
-        <p:spPr>
-          <a:xfrm>
-            <a:off x="6325567" y="1637608"/>
-            <a:ext cx="2904762" cy="3978169"/>
+        </p:nvSpPr>
+        <p:spPr>
+          <a:xfrm>
+            <a:off x="5838038" y="5239965"/>
+            <a:ext cx="4914629" cy="923330"/>
           </a:xfrm>
           <a:prstGeom prst="rect">
             <a:avLst/>
           </a:prstGeom>
         </p:spPr>
-      </p:pic>
+        <p:txBody>
+          <a:bodyPr wrap="square">
+            <a:spAutoFit/>
+          </a:bodyPr>
+          <a:lstStyle/>
+          <a:p>
+            <a:pPr marL="285750" indent="-285750">
+              <a:buFont typeface="Arial" panose="020B0604020202020204" pitchFamily="34" charset="0"/>
+              <a:buChar char="•"/>
+            </a:pPr>
+            <a:r>
+              <a:rPr lang="en-US" dirty="0">
+                <a:latin typeface="Calibri (Body)"/>
+              </a:rPr>
+              <a:t>stamp	: s</a:t>
+            </a:r>
+            <a:r>
+              <a:rPr lang="en-GB" dirty="0"/>
+              <a:t>tamp</a:t>
+            </a:r>
+          </a:p>
+          <a:p>
+            <a:pPr marL="285750" indent="-285750">
+              <a:buFont typeface="Arial" panose="020B0604020202020204" pitchFamily="34" charset="0"/>
+              <a:buChar char="•"/>
+            </a:pPr>
+            <a:r>
+              <a:rPr lang="en-US" dirty="0">
+                <a:latin typeface="Calibri (Body)"/>
+              </a:rPr>
+              <a:t>die	: </a:t>
+            </a:r>
+            <a:r>
+              <a:rPr lang="en-GB" dirty="0"/>
+              <a:t>die</a:t>
+            </a:r>
+          </a:p>
+          <a:p>
+            <a:pPr lvl="1"/>
+            <a:endParaRPr lang="en-US" dirty="0">
+              <a:latin typeface="Calibri (Body)"/>
+            </a:endParaRPr>
+          </a:p>
+        </p:txBody>
+      </p:sp>
       <p:pic>
         <p:nvPicPr>
-          <p:cNvPr id="11" name="Picture 10">
+          <p:cNvPr id="6" name="Picture 5">
             <a:extLst>
               <a:ext uri="{FF2B5EF4-FFF2-40B4-BE49-F238E27FC236}">
-                <a16:creationId xmlns:a16="http://schemas.microsoft.com/office/drawing/2014/main" id="{8E963827-2085-485C-88A2-7162C8A4AA5D}"/>
+                <a16:creationId xmlns:a16="http://schemas.microsoft.com/office/drawing/2014/main" id="{DE2388C2-AD1F-44F1-A0D2-A0EA4264BFB1}"/>
               </a:ext>
             </a:extLst>
           </p:cNvPr>
@@ -16048,25 +16696,86 @@
           <p:nvPr/>
         </p:nvPicPr>
         <p:blipFill>
-          <a:blip r:embed="rId5"/>
+          <a:blip r:embed="rId4"/>
           <a:stretch>
             <a:fillRect/>
           </a:stretch>
         </p:blipFill>
         <p:spPr>
           <a:xfrm>
-            <a:off x="9243488" y="1637608"/>
-            <a:ext cx="2885714" cy="3466667"/>
+            <a:off x="6300420" y="1415551"/>
+            <a:ext cx="5290107" cy="3357688"/>
           </a:xfrm>
           <a:prstGeom prst="rect">
             <a:avLst/>
           </a:prstGeom>
         </p:spPr>
       </p:pic>
+      <p:sp>
+        <p:nvSpPr>
+          <p:cNvPr id="21" name="Rectangle: Rounded Corners 20">
+            <a:extLst>
+              <a:ext uri="{FF2B5EF4-FFF2-40B4-BE49-F238E27FC236}">
+                <a16:creationId xmlns:a16="http://schemas.microsoft.com/office/drawing/2014/main" id="{9802B92E-0BBF-4D57-9A3D-FE1837456407}"/>
+              </a:ext>
+            </a:extLst>
+          </p:cNvPr>
+          <p:cNvSpPr/>
+          <p:nvPr/>
+        </p:nvSpPr>
+        <p:spPr>
+          <a:xfrm>
+            <a:off x="5838038" y="4864509"/>
+            <a:ext cx="2249001" cy="397949"/>
+          </a:xfrm>
+          <a:prstGeom prst="roundRect">
+            <a:avLst/>
+          </a:prstGeom>
+          <a:solidFill>
+            <a:schemeClr val="bg1"/>
+          </a:solidFill>
+          <a:ln>
+            <a:solidFill>
+              <a:schemeClr val="tx1"/>
+            </a:solidFill>
+          </a:ln>
+        </p:spPr>
+        <p:style>
+          <a:lnRef idx="2">
+            <a:schemeClr val="accent1">
+              <a:shade val="50000"/>
+            </a:schemeClr>
+          </a:lnRef>
+          <a:fillRef idx="1">
+            <a:schemeClr val="accent1"/>
+          </a:fillRef>
+          <a:effectRef idx="0">
+            <a:schemeClr val="accent1"/>
+          </a:effectRef>
+          <a:fontRef idx="minor">
+            <a:schemeClr val="lt1"/>
+          </a:fontRef>
+        </p:style>
+        <p:txBody>
+          <a:bodyPr rtlCol="0" anchor="ctr"/>
+          <a:lstStyle/>
+          <a:p>
+            <a:pPr algn="ctr"/>
+            <a:r>
+              <a:rPr lang="en-US" b="1" dirty="0">
+                <a:solidFill>
+                  <a:schemeClr val="tx1"/>
+                </a:solidFill>
+              </a:rPr>
+              <a:t>DICTIONARY</a:t>
+            </a:r>
+          </a:p>
+        </p:txBody>
+      </p:sp>
     </p:spTree>
     <p:extLst>
       <p:ext uri="{BB962C8B-B14F-4D97-AF65-F5344CB8AC3E}">
-        <p14:creationId xmlns:p14="http://schemas.microsoft.com/office/powerpoint/2010/main" val="3593010146"/>
+        <p14:creationId xmlns:p14="http://schemas.microsoft.com/office/powerpoint/2010/main" val="3382369956"/>
       </p:ext>
     </p:extLst>
   </p:cSld>

</xml_diff>